<commit_message>
Adding a few more plots and a couple of slides
</commit_message>
<xml_diff>
--- a/Seattle_Airbnb_2017_DI.pptx
+++ b/Seattle_Airbnb_2017_DI.pptx
@@ -11,9 +11,12 @@
     <p:sldId id="259" r:id="rId5"/>
     <p:sldId id="260" r:id="rId6"/>
     <p:sldId id="262" r:id="rId7"/>
-    <p:sldId id="263" r:id="rId8"/>
-    <p:sldId id="264" r:id="rId9"/>
-    <p:sldId id="265" r:id="rId10"/>
+    <p:sldId id="266" r:id="rId8"/>
+    <p:sldId id="267" r:id="rId9"/>
+    <p:sldId id="269" r:id="rId10"/>
+    <p:sldId id="263" r:id="rId11"/>
+    <p:sldId id="264" r:id="rId12"/>
+    <p:sldId id="265" r:id="rId13"/>
   </p:sldIdLst>
   <p:sldSz cx="12192000" cy="6858000"/>
   <p:notesSz cx="6858000" cy="9144000"/>
@@ -366,7 +369,7 @@
             <a:fld id="{B61BEF0D-F0BB-DE4B-95CE-6DB70DBA9567}" type="datetimeFigureOut">
               <a:rPr lang="en-US" dirty="0"/>
               <a:pPr/>
-              <a:t>4/6/2021</a:t>
+              <a:t>4/7/2021</a:t>
             </a:fld>
             <a:endParaRPr lang="en-US" dirty="0"/>
           </a:p>
@@ -625,7 +628,7 @@
             <a:fld id="{B61BEF0D-F0BB-DE4B-95CE-6DB70DBA9567}" type="datetimeFigureOut">
               <a:rPr lang="en-US" dirty="0"/>
               <a:pPr/>
-              <a:t>4/6/2021</a:t>
+              <a:t>4/7/2021</a:t>
             </a:fld>
             <a:endParaRPr lang="en-US" dirty="0"/>
           </a:p>
@@ -857,7 +860,7 @@
             <a:fld id="{B61BEF0D-F0BB-DE4B-95CE-6DB70DBA9567}" type="datetimeFigureOut">
               <a:rPr lang="en-US" dirty="0"/>
               <a:pPr/>
-              <a:t>4/6/2021</a:t>
+              <a:t>4/7/2021</a:t>
             </a:fld>
             <a:endParaRPr lang="en-US" dirty="0"/>
           </a:p>
@@ -1111,7 +1114,7 @@
             <a:fld id="{B61BEF0D-F0BB-DE4B-95CE-6DB70DBA9567}" type="datetimeFigureOut">
               <a:rPr lang="en-US" dirty="0"/>
               <a:pPr/>
-              <a:t>4/6/2021</a:t>
+              <a:t>4/7/2021</a:t>
             </a:fld>
             <a:endParaRPr lang="en-US" dirty="0"/>
           </a:p>
@@ -1415,7 +1418,7 @@
             <a:fld id="{B61BEF0D-F0BB-DE4B-95CE-6DB70DBA9567}" type="datetimeFigureOut">
               <a:rPr lang="en-US" dirty="0"/>
               <a:pPr/>
-              <a:t>4/6/2021</a:t>
+              <a:t>4/7/2021</a:t>
             </a:fld>
             <a:endParaRPr lang="en-US" dirty="0"/>
           </a:p>
@@ -1744,7 +1747,7 @@
             <a:fld id="{B61BEF0D-F0BB-DE4B-95CE-6DB70DBA9567}" type="datetimeFigureOut">
               <a:rPr lang="en-US" dirty="0"/>
               <a:pPr/>
-              <a:t>4/6/2021</a:t>
+              <a:t>4/7/2021</a:t>
             </a:fld>
             <a:endParaRPr lang="en-US" dirty="0"/>
           </a:p>
@@ -2193,7 +2196,7 @@
             <a:fld id="{B61BEF0D-F0BB-DE4B-95CE-6DB70DBA9567}" type="datetimeFigureOut">
               <a:rPr lang="en-US" dirty="0"/>
               <a:pPr/>
-              <a:t>4/6/2021</a:t>
+              <a:t>4/7/2021</a:t>
             </a:fld>
             <a:endParaRPr lang="en-US" dirty="0"/>
           </a:p>
@@ -2352,7 +2355,7 @@
             <a:fld id="{B61BEF0D-F0BB-DE4B-95CE-6DB70DBA9567}" type="datetimeFigureOut">
               <a:rPr lang="en-US" dirty="0"/>
               <a:pPr/>
-              <a:t>4/6/2021</a:t>
+              <a:t>4/7/2021</a:t>
             </a:fld>
             <a:endParaRPr lang="en-US" dirty="0"/>
           </a:p>
@@ -2444,7 +2447,7 @@
             <a:fld id="{B61BEF0D-F0BB-DE4B-95CE-6DB70DBA9567}" type="datetimeFigureOut">
               <a:rPr lang="en-US" dirty="0"/>
               <a:pPr/>
-              <a:t>4/6/2021</a:t>
+              <a:t>4/7/2021</a:t>
             </a:fld>
             <a:endParaRPr lang="en-US" dirty="0"/>
           </a:p>
@@ -2818,7 +2821,7 @@
             <a:fld id="{B61BEF0D-F0BB-DE4B-95CE-6DB70DBA9567}" type="datetimeFigureOut">
               <a:rPr lang="en-US" dirty="0"/>
               <a:pPr/>
-              <a:t>4/6/2021</a:t>
+              <a:t>4/7/2021</a:t>
             </a:fld>
             <a:endParaRPr lang="en-US" dirty="0"/>
           </a:p>
@@ -3103,7 +3106,7 @@
             <a:fld id="{B61BEF0D-F0BB-DE4B-95CE-6DB70DBA9567}" type="datetimeFigureOut">
               <a:rPr lang="en-US" dirty="0"/>
               <a:pPr/>
-              <a:t>4/6/2021</a:t>
+              <a:t>4/7/2021</a:t>
             </a:fld>
             <a:endParaRPr lang="en-US" dirty="0"/>
           </a:p>
@@ -3311,7 +3314,7 @@
             <a:fld id="{B61BEF0D-F0BB-DE4B-95CE-6DB70DBA9567}" type="datetimeFigureOut">
               <a:rPr lang="en-US" dirty="0"/>
               <a:pPr/>
-              <a:t>4/6/2021</a:t>
+              <a:t>4/7/2021</a:t>
             </a:fld>
             <a:endParaRPr lang="en-US" dirty="0"/>
           </a:p>
@@ -3978,8 +3981,8 @@
         </p:nvSpPr>
         <p:spPr>
           <a:xfrm>
-            <a:off x="8375373" y="4902283"/>
-            <a:ext cx="3101009" cy="1200329"/>
+            <a:off x="7469945" y="4930419"/>
+            <a:ext cx="3964234" cy="1200329"/>
           </a:xfrm>
           <a:prstGeom prst="rect">
             <a:avLst/>
@@ -4027,6 +4030,549 @@
     <p:extLst>
       <p:ext uri="{BB962C8B-B14F-4D97-AF65-F5344CB8AC3E}">
         <p14:creationId xmlns:p14="http://schemas.microsoft.com/office/powerpoint/2010/main" val="1090213586"/>
+      </p:ext>
+    </p:extLst>
+  </p:cSld>
+  <p:clrMapOvr>
+    <a:masterClrMapping/>
+  </p:clrMapOvr>
+</p:sld>
+</file>
+
+<file path=ppt/slides/slide10.xml><?xml version="1.0" encoding="utf-8"?>
+<p:sld xmlns:a="http://schemas.openxmlformats.org/drawingml/2006/main" xmlns:r="http://schemas.openxmlformats.org/officeDocument/2006/relationships" xmlns:p="http://schemas.openxmlformats.org/presentationml/2006/main">
+  <p:cSld>
+    <p:spTree>
+      <p:nvGrpSpPr>
+        <p:cNvPr id="1" name=""/>
+        <p:cNvGrpSpPr/>
+        <p:nvPr/>
+      </p:nvGrpSpPr>
+      <p:grpSpPr>
+        <a:xfrm>
+          <a:off x="0" y="0"/>
+          <a:ext cx="0" cy="0"/>
+          <a:chOff x="0" y="0"/>
+          <a:chExt cx="0" cy="0"/>
+        </a:xfrm>
+      </p:grpSpPr>
+      <p:sp>
+        <p:nvSpPr>
+          <p:cNvPr id="2" name="Title 1">
+            <a:extLst>
+              <a:ext uri="{FF2B5EF4-FFF2-40B4-BE49-F238E27FC236}">
+                <a16:creationId xmlns:a16="http://schemas.microsoft.com/office/drawing/2014/main" id="{0691FDD3-838B-4F2B-A0E7-2F82B7AF0BEB}"/>
+              </a:ext>
+            </a:extLst>
+          </p:cNvPr>
+          <p:cNvSpPr>
+            <a:spLocks noGrp="1"/>
+          </p:cNvSpPr>
+          <p:nvPr>
+            <p:ph type="title"/>
+          </p:nvPr>
+        </p:nvSpPr>
+        <p:spPr/>
+        <p:txBody>
+          <a:bodyPr/>
+          <a:lstStyle/>
+          <a:p>
+            <a:r>
+              <a:rPr lang="en-US" dirty="0"/>
+              <a:t>RELATIVE IMPORTANCE OF  the FACTORS</a:t>
+            </a:r>
+          </a:p>
+        </p:txBody>
+      </p:sp>
+      <p:sp>
+        <p:nvSpPr>
+          <p:cNvPr id="4" name="Content Placeholder 3">
+            <a:extLst>
+              <a:ext uri="{FF2B5EF4-FFF2-40B4-BE49-F238E27FC236}">
+                <a16:creationId xmlns:a16="http://schemas.microsoft.com/office/drawing/2014/main" id="{2D0ACFE5-497C-4B59-B7C1-0FF00B7722D9}"/>
+              </a:ext>
+            </a:extLst>
+          </p:cNvPr>
+          <p:cNvSpPr>
+            <a:spLocks noGrp="1"/>
+          </p:cNvSpPr>
+          <p:nvPr>
+            <p:ph sz="half" idx="2"/>
+          </p:nvPr>
+        </p:nvSpPr>
+        <p:spPr>
+          <a:xfrm>
+            <a:off x="6188417" y="2191096"/>
+            <a:ext cx="5791548" cy="4666904"/>
+          </a:xfrm>
+        </p:spPr>
+        <p:txBody>
+          <a:bodyPr>
+            <a:normAutofit fontScale="62500" lnSpcReduction="20000"/>
+          </a:bodyPr>
+          <a:lstStyle/>
+          <a:p>
+            <a:r>
+              <a:rPr lang="en-US" sz="2900" dirty="0"/>
+              <a:t>Trained </a:t>
+            </a:r>
+            <a:r>
+              <a:rPr lang="en-US" sz="2900" dirty="0">
+                <a:hlinkClick r:id="rId2"/>
+              </a:rPr>
+              <a:t>XGBRegressor</a:t>
+            </a:r>
+            <a:r>
+              <a:rPr lang="en-US" sz="2900" dirty="0"/>
+              <a:t> model on listing and booking data to predicts the revenue and </a:t>
+            </a:r>
+            <a:r>
+              <a:rPr lang="en-US" sz="2900" dirty="0" err="1"/>
+              <a:t>ro</a:t>
+            </a:r>
+            <a:r>
+              <a:rPr lang="en-US" sz="2900" dirty="0"/>
+              <a:t> unravel the relative importance of the features:</a:t>
+            </a:r>
+          </a:p>
+          <a:p>
+            <a:pPr lvl="1"/>
+            <a:r>
+              <a:rPr lang="en-US" sz="2500" dirty="0"/>
+              <a:t>‘accommodates’ and ‘</a:t>
+            </a:r>
+            <a:r>
+              <a:rPr lang="en-US" sz="2500" dirty="0" err="1"/>
+              <a:t>price_per_customer</a:t>
+            </a:r>
+            <a:r>
+              <a:rPr lang="en-US" sz="2500" dirty="0"/>
+              <a:t>’ are the most important predictors of the revenue: the larger the number of people and the price per person the larger is the revenue</a:t>
+            </a:r>
+          </a:p>
+          <a:p>
+            <a:pPr lvl="1"/>
+            <a:r>
+              <a:rPr lang="en-US" sz="2900" dirty="0"/>
+              <a:t>‘</a:t>
+            </a:r>
+            <a:r>
+              <a:rPr lang="en-US" sz="2900" dirty="0" err="1"/>
+              <a:t>std_price_norm</a:t>
+            </a:r>
+            <a:r>
+              <a:rPr lang="en-US" sz="2900" dirty="0"/>
+              <a:t>’:  adjusting the prices (depending on demand) increases the revenue</a:t>
+            </a:r>
+          </a:p>
+          <a:p>
+            <a:pPr lvl="1"/>
+            <a:r>
+              <a:rPr lang="en-US" sz="2900" dirty="0"/>
+              <a:t>‘</a:t>
+            </a:r>
+            <a:r>
+              <a:rPr lang="en-US" sz="2900" dirty="0" err="1"/>
+              <a:t>room_type</a:t>
+            </a:r>
+            <a:r>
+              <a:rPr lang="en-US" sz="2900" dirty="0"/>
+              <a:t>’:  renting whole houses and private rooms bring larger revenue than shared rooms</a:t>
+            </a:r>
+          </a:p>
+          <a:p>
+            <a:pPr lvl="1"/>
+            <a:r>
+              <a:rPr lang="en-US" sz="2900" dirty="0"/>
+              <a:t>‘</a:t>
+            </a:r>
+            <a:r>
+              <a:rPr lang="en-US" sz="2900" dirty="0" err="1"/>
+              <a:t>extra_guest_fraction</a:t>
+            </a:r>
+            <a:r>
+              <a:rPr lang="en-US" sz="2900" dirty="0"/>
+              <a:t>’: too many extra guests  have negative effect on revenue</a:t>
+            </a:r>
+          </a:p>
+          <a:p>
+            <a:pPr lvl="1"/>
+            <a:r>
+              <a:rPr lang="en-US" sz="2800" dirty="0"/>
+              <a:t>‘experience’:  host’s experience increases the revenue</a:t>
+            </a:r>
+          </a:p>
+          <a:p>
+            <a:pPr lvl="1"/>
+            <a:r>
+              <a:rPr lang="en-US" sz="2800" dirty="0"/>
+              <a:t>‘</a:t>
+            </a:r>
+            <a:r>
+              <a:rPr lang="en-US" sz="2800" dirty="0" err="1"/>
+              <a:t>bathrooms_per_bedroom</a:t>
+            </a:r>
+            <a:r>
+              <a:rPr lang="en-US" sz="2800" dirty="0"/>
+              <a:t>’:  more than one bathroom per bedroom decreases the revenue</a:t>
+            </a:r>
+          </a:p>
+          <a:p>
+            <a:pPr lvl="1"/>
+            <a:r>
+              <a:rPr lang="en-US" sz="2800" dirty="0"/>
+              <a:t>‘cancellation policy’:  strict cancellation policy increases the revenue</a:t>
+            </a:r>
+          </a:p>
+        </p:txBody>
+      </p:sp>
+      <p:pic>
+        <p:nvPicPr>
+          <p:cNvPr id="6146" name="Picture 2">
+            <a:extLst>
+              <a:ext uri="{FF2B5EF4-FFF2-40B4-BE49-F238E27FC236}">
+                <a16:creationId xmlns:a16="http://schemas.microsoft.com/office/drawing/2014/main" id="{1DFDB713-2F0E-47F0-946A-595CB2CD76C3}"/>
+              </a:ext>
+            </a:extLst>
+          </p:cNvPr>
+          <p:cNvPicPr>
+            <a:picLocks noGrp="1" noChangeAspect="1" noChangeArrowheads="1"/>
+          </p:cNvPicPr>
+          <p:nvPr>
+            <p:ph sz="half" idx="1"/>
+          </p:nvPr>
+        </p:nvPicPr>
+        <p:blipFill>
+          <a:blip r:embed="rId3">
+            <a:extLst>
+              <a:ext uri="{28A0092B-C50C-407E-A947-70E740481C1C}">
+                <a14:useLocalDpi xmlns:a14="http://schemas.microsoft.com/office/drawing/2010/main" val="0"/>
+              </a:ext>
+            </a:extLst>
+          </a:blip>
+          <a:srcRect/>
+          <a:stretch>
+            <a:fillRect/>
+          </a:stretch>
+        </p:blipFill>
+        <p:spPr bwMode="auto">
+          <a:xfrm>
+            <a:off x="-13998" y="2177844"/>
+            <a:ext cx="6136502" cy="4666904"/>
+          </a:xfrm>
+          <a:prstGeom prst="rect">
+            <a:avLst/>
+          </a:prstGeom>
+          <a:noFill/>
+          <a:extLst>
+            <a:ext uri="{909E8E84-426E-40DD-AFC4-6F175D3DCCD1}">
+              <a14:hiddenFill xmlns:a14="http://schemas.microsoft.com/office/drawing/2010/main">
+                <a:solidFill>
+                  <a:srgbClr val="FFFFFF"/>
+                </a:solidFill>
+              </a14:hiddenFill>
+            </a:ext>
+          </a:extLst>
+        </p:spPr>
+      </p:pic>
+    </p:spTree>
+    <p:extLst>
+      <p:ext uri="{BB962C8B-B14F-4D97-AF65-F5344CB8AC3E}">
+        <p14:creationId xmlns:p14="http://schemas.microsoft.com/office/powerpoint/2010/main" val="2059797988"/>
+      </p:ext>
+    </p:extLst>
+  </p:cSld>
+  <p:clrMapOvr>
+    <a:masterClrMapping/>
+  </p:clrMapOvr>
+</p:sld>
+</file>
+
+<file path=ppt/slides/slide11.xml><?xml version="1.0" encoding="utf-8"?>
+<p:sld xmlns:a="http://schemas.openxmlformats.org/drawingml/2006/main" xmlns:r="http://schemas.openxmlformats.org/officeDocument/2006/relationships" xmlns:p="http://schemas.openxmlformats.org/presentationml/2006/main">
+  <p:cSld>
+    <p:spTree>
+      <p:nvGrpSpPr>
+        <p:cNvPr id="1" name=""/>
+        <p:cNvGrpSpPr/>
+        <p:nvPr/>
+      </p:nvGrpSpPr>
+      <p:grpSpPr>
+        <a:xfrm>
+          <a:off x="0" y="0"/>
+          <a:ext cx="0" cy="0"/>
+          <a:chOff x="0" y="0"/>
+          <a:chExt cx="0" cy="0"/>
+        </a:xfrm>
+      </p:grpSpPr>
+      <p:sp>
+        <p:nvSpPr>
+          <p:cNvPr id="2" name="Title 1">
+            <a:extLst>
+              <a:ext uri="{FF2B5EF4-FFF2-40B4-BE49-F238E27FC236}">
+                <a16:creationId xmlns:a16="http://schemas.microsoft.com/office/drawing/2014/main" id="{0691FDD3-838B-4F2B-A0E7-2F82B7AF0BEB}"/>
+              </a:ext>
+            </a:extLst>
+          </p:cNvPr>
+          <p:cNvSpPr>
+            <a:spLocks noGrp="1"/>
+          </p:cNvSpPr>
+          <p:nvPr>
+            <p:ph type="title"/>
+          </p:nvPr>
+        </p:nvSpPr>
+        <p:spPr/>
+        <p:txBody>
+          <a:bodyPr/>
+          <a:lstStyle/>
+          <a:p>
+            <a:r>
+              <a:rPr lang="en-US" dirty="0"/>
+              <a:t>A SAMPLE of model predictions</a:t>
+            </a:r>
+          </a:p>
+        </p:txBody>
+      </p:sp>
+      <p:sp>
+        <p:nvSpPr>
+          <p:cNvPr id="4" name="Content Placeholder 3">
+            <a:extLst>
+              <a:ext uri="{FF2B5EF4-FFF2-40B4-BE49-F238E27FC236}">
+                <a16:creationId xmlns:a16="http://schemas.microsoft.com/office/drawing/2014/main" id="{2D0ACFE5-497C-4B59-B7C1-0FF00B7722D9}"/>
+              </a:ext>
+            </a:extLst>
+          </p:cNvPr>
+          <p:cNvSpPr>
+            <a:spLocks noGrp="1"/>
+          </p:cNvSpPr>
+          <p:nvPr>
+            <p:ph idx="1"/>
+          </p:nvPr>
+        </p:nvSpPr>
+        <p:spPr>
+          <a:xfrm>
+            <a:off x="581193" y="2021470"/>
+            <a:ext cx="11029615" cy="4677504"/>
+          </a:xfrm>
+        </p:spPr>
+        <p:txBody>
+          <a:bodyPr>
+            <a:normAutofit/>
+          </a:bodyPr>
+          <a:lstStyle/>
+          <a:p>
+            <a:pPr>
+              <a:buFont typeface="Arial" panose="020B0604020202020204" pitchFamily="34" charset="0"/>
+              <a:buChar char="•"/>
+            </a:pPr>
+            <a:r>
+              <a:rPr lang="en-US" sz="2400" dirty="0"/>
+              <a:t>One person apartment in Downtown area: </a:t>
+            </a:r>
+            <a:r>
+              <a:rPr lang="en-US" sz="2000" dirty="0"/>
+              <a:t>$50 per guest typical price,  $11 extra people fee</a:t>
+            </a:r>
+          </a:p>
+          <a:p>
+            <a:pPr lvl="1">
+              <a:buFont typeface="Arial" panose="020B0604020202020204" pitchFamily="34" charset="0"/>
+              <a:buChar char="•"/>
+            </a:pPr>
+            <a:r>
+              <a:rPr lang="en-US" sz="2000" dirty="0"/>
+              <a:t>$32 expected daily revenue</a:t>
+            </a:r>
+          </a:p>
+          <a:p>
+            <a:pPr lvl="1">
+              <a:buFont typeface="Arial" panose="020B0604020202020204" pitchFamily="34" charset="0"/>
+              <a:buChar char="•"/>
+            </a:pPr>
+            <a:r>
+              <a:rPr lang="en-US" sz="2000" dirty="0"/>
+              <a:t>45% expected daily booking rate</a:t>
+            </a:r>
+          </a:p>
+          <a:p>
+            <a:pPr>
+              <a:buFont typeface="Arial" panose="020B0604020202020204" pitchFamily="34" charset="0"/>
+              <a:buChar char="•"/>
+            </a:pPr>
+            <a:r>
+              <a:rPr lang="en-US" sz="2400" dirty="0"/>
+              <a:t>Two person house in Lake City: </a:t>
+            </a:r>
+            <a:r>
+              <a:rPr lang="en-US" sz="2000" dirty="0"/>
+              <a:t>$40 per guest typical price,  $14 extra people fee</a:t>
+            </a:r>
+          </a:p>
+          <a:p>
+            <a:pPr lvl="1">
+              <a:buFont typeface="Arial" panose="020B0604020202020204" pitchFamily="34" charset="0"/>
+              <a:buChar char="•"/>
+            </a:pPr>
+            <a:r>
+              <a:rPr lang="en-US" sz="2000" dirty="0"/>
+              <a:t>$52 expected daily revenue</a:t>
+            </a:r>
+          </a:p>
+          <a:p>
+            <a:pPr lvl="1">
+              <a:buFont typeface="Arial" panose="020B0604020202020204" pitchFamily="34" charset="0"/>
+              <a:buChar char="•"/>
+            </a:pPr>
+            <a:r>
+              <a:rPr lang="en-US" sz="2000" dirty="0"/>
+              <a:t>79% expected daily booking rate</a:t>
+            </a:r>
+          </a:p>
+          <a:p>
+            <a:pPr>
+              <a:buFont typeface="Arial" panose="020B0604020202020204" pitchFamily="34" charset="0"/>
+              <a:buChar char="•"/>
+            </a:pPr>
+            <a:r>
+              <a:rPr lang="en-US" sz="2400" dirty="0"/>
+              <a:t>Four person house in Magnolia:  </a:t>
+            </a:r>
+            <a:r>
+              <a:rPr lang="en-US" sz="2000" dirty="0"/>
+              <a:t>$35 per guest typical price, $13 for extra people fee</a:t>
+            </a:r>
+          </a:p>
+          <a:p>
+            <a:pPr lvl="1">
+              <a:buFont typeface="Arial" panose="020B0604020202020204" pitchFamily="34" charset="0"/>
+              <a:buChar char="•"/>
+            </a:pPr>
+            <a:r>
+              <a:rPr lang="en-US" sz="2000" dirty="0"/>
+              <a:t>$94 expected daily revenue</a:t>
+            </a:r>
+          </a:p>
+          <a:p>
+            <a:pPr lvl="1">
+              <a:buFont typeface="Arial" panose="020B0604020202020204" pitchFamily="34" charset="0"/>
+              <a:buChar char="•"/>
+            </a:pPr>
+            <a:r>
+              <a:rPr lang="en-US" sz="2000" dirty="0"/>
+              <a:t>66% expected daily booking rate</a:t>
+            </a:r>
+          </a:p>
+        </p:txBody>
+      </p:sp>
+    </p:spTree>
+    <p:extLst>
+      <p:ext uri="{BB962C8B-B14F-4D97-AF65-F5344CB8AC3E}">
+        <p14:creationId xmlns:p14="http://schemas.microsoft.com/office/powerpoint/2010/main" val="1195710726"/>
+      </p:ext>
+    </p:extLst>
+  </p:cSld>
+  <p:clrMapOvr>
+    <a:masterClrMapping/>
+  </p:clrMapOvr>
+</p:sld>
+</file>
+
+<file path=ppt/slides/slide12.xml><?xml version="1.0" encoding="utf-8"?>
+<p:sld xmlns:a="http://schemas.openxmlformats.org/drawingml/2006/main" xmlns:r="http://schemas.openxmlformats.org/officeDocument/2006/relationships" xmlns:p="http://schemas.openxmlformats.org/presentationml/2006/main">
+  <p:cSld>
+    <p:spTree>
+      <p:nvGrpSpPr>
+        <p:cNvPr id="1" name=""/>
+        <p:cNvGrpSpPr/>
+        <p:nvPr/>
+      </p:nvGrpSpPr>
+      <p:grpSpPr>
+        <a:xfrm>
+          <a:off x="0" y="0"/>
+          <a:ext cx="0" cy="0"/>
+          <a:chOff x="0" y="0"/>
+          <a:chExt cx="0" cy="0"/>
+        </a:xfrm>
+      </p:grpSpPr>
+      <p:sp>
+        <p:nvSpPr>
+          <p:cNvPr id="2" name="Title 1">
+            <a:extLst>
+              <a:ext uri="{FF2B5EF4-FFF2-40B4-BE49-F238E27FC236}">
+                <a16:creationId xmlns:a16="http://schemas.microsoft.com/office/drawing/2014/main" id="{C8013EEC-65BE-464C-B900-E09510E6AB4C}"/>
+              </a:ext>
+            </a:extLst>
+          </p:cNvPr>
+          <p:cNvSpPr>
+            <a:spLocks noGrp="1"/>
+          </p:cNvSpPr>
+          <p:nvPr>
+            <p:ph type="title"/>
+          </p:nvPr>
+        </p:nvSpPr>
+        <p:spPr/>
+        <p:txBody>
+          <a:bodyPr/>
+          <a:lstStyle/>
+          <a:p>
+            <a:r>
+              <a:rPr lang="en-US" dirty="0"/>
+              <a:t>Summary</a:t>
+            </a:r>
+          </a:p>
+        </p:txBody>
+      </p:sp>
+      <p:sp>
+        <p:nvSpPr>
+          <p:cNvPr id="3" name="Content Placeholder 2">
+            <a:extLst>
+              <a:ext uri="{FF2B5EF4-FFF2-40B4-BE49-F238E27FC236}">
+                <a16:creationId xmlns:a16="http://schemas.microsoft.com/office/drawing/2014/main" id="{A443B0B5-E40F-41C5-8A59-48C4E08209D8}"/>
+              </a:ext>
+            </a:extLst>
+          </p:cNvPr>
+          <p:cNvSpPr>
+            <a:spLocks noGrp="1"/>
+          </p:cNvSpPr>
+          <p:nvPr>
+            <p:ph idx="1"/>
+          </p:nvPr>
+        </p:nvSpPr>
+        <p:spPr>
+          <a:xfrm>
+            <a:off x="581192" y="2180496"/>
+            <a:ext cx="11029615" cy="4127539"/>
+          </a:xfrm>
+        </p:spPr>
+        <p:txBody>
+          <a:bodyPr>
+            <a:normAutofit fontScale="92500" lnSpcReduction="20000"/>
+          </a:bodyPr>
+          <a:lstStyle/>
+          <a:p>
+            <a:r>
+              <a:rPr lang="en-US" dirty="0"/>
+              <a:t>The revenue decreases around Christmas, New Year, Easter, and the Fourth of July.  Market prices surge and the revenue increases during the summer, when there is an increased demand for the Airbnb hosts due to the increased number of people taking vacations. </a:t>
+            </a:r>
+          </a:p>
+          <a:p>
+            <a:r>
+              <a:rPr lang="en-US" dirty="0"/>
+              <a:t>Higher guest prices, larger accommodations, stricter cancellation policies, and larger fees for extra guests all increase the revenue.  Price per customer and the number of people accommodated are the most important predictors. Price adjustments (depending on the demand) increase the revenue also.</a:t>
+            </a:r>
+          </a:p>
+          <a:p>
+            <a:r>
+              <a:rPr lang="en-US" dirty="0"/>
+              <a:t>The revenue and the booking rate models provide forecasts of the expected daily revenue and the booking rate for specified host's property attributes, pricing, policies, and location.  </a:t>
+            </a:r>
+          </a:p>
+        </p:txBody>
+      </p:sp>
+    </p:spTree>
+    <p:extLst>
+      <p:ext uri="{BB962C8B-B14F-4D97-AF65-F5344CB8AC3E}">
+        <p14:creationId xmlns:p14="http://schemas.microsoft.com/office/powerpoint/2010/main" val="3133424421"/>
       </p:ext>
     </p:extLst>
   </p:cSld>
@@ -5105,10 +5651,10 @@
       </p:grpSpPr>
       <p:sp>
         <p:nvSpPr>
-          <p:cNvPr id="2" name="Title 1">
+          <p:cNvPr id="4" name="Title 3">
             <a:extLst>
               <a:ext uri="{FF2B5EF4-FFF2-40B4-BE49-F238E27FC236}">
-                <a16:creationId xmlns:a16="http://schemas.microsoft.com/office/drawing/2014/main" id="{0691FDD3-838B-4F2B-A0E7-2F82B7AF0BEB}"/>
+                <a16:creationId xmlns:a16="http://schemas.microsoft.com/office/drawing/2014/main" id="{A4AE8447-D877-4CF1-8171-060F3350425C}"/>
               </a:ext>
             </a:extLst>
           </p:cNvPr>
@@ -5126,136 +5672,17 @@
           <a:p>
             <a:r>
               <a:rPr lang="en-US" dirty="0"/>
-              <a:t>OTHER FACTORS</a:t>
-            </a:r>
-          </a:p>
-        </p:txBody>
-      </p:sp>
-      <p:sp>
-        <p:nvSpPr>
-          <p:cNvPr id="4" name="Content Placeholder 3">
+              <a:t>Typical pricing</a:t>
+            </a:r>
+          </a:p>
+        </p:txBody>
+      </p:sp>
+      <p:pic>
+        <p:nvPicPr>
+          <p:cNvPr id="1026" name="Picture 2">
             <a:extLst>
               <a:ext uri="{FF2B5EF4-FFF2-40B4-BE49-F238E27FC236}">
-                <a16:creationId xmlns:a16="http://schemas.microsoft.com/office/drawing/2014/main" id="{2D0ACFE5-497C-4B59-B7C1-0FF00B7722D9}"/>
-              </a:ext>
-            </a:extLst>
-          </p:cNvPr>
-          <p:cNvSpPr>
-            <a:spLocks noGrp="1"/>
-          </p:cNvSpPr>
-          <p:nvPr>
-            <p:ph sz="half" idx="2"/>
-          </p:nvPr>
-        </p:nvSpPr>
-        <p:spPr>
-          <a:xfrm>
-            <a:off x="6188417" y="2191096"/>
-            <a:ext cx="5791548" cy="4666904"/>
-          </a:xfrm>
-        </p:spPr>
-        <p:txBody>
-          <a:bodyPr>
-            <a:normAutofit fontScale="70000" lnSpcReduction="20000"/>
-          </a:bodyPr>
-          <a:lstStyle/>
-          <a:p>
-            <a:r>
-              <a:rPr lang="en-US" sz="2900" dirty="0"/>
-              <a:t>Trained </a:t>
-            </a:r>
-            <a:r>
-              <a:rPr lang="en-US" sz="2900" dirty="0">
-                <a:hlinkClick r:id="rId2"/>
-              </a:rPr>
-              <a:t>XGBRegressor</a:t>
-            </a:r>
-            <a:r>
-              <a:rPr lang="en-US" sz="2900" dirty="0"/>
-              <a:t> model on listing and booking data to predicts the revenue and unravel important features:</a:t>
-            </a:r>
-          </a:p>
-          <a:p>
-            <a:pPr lvl="1"/>
-            <a:r>
-              <a:rPr lang="en-US" sz="2900" dirty="0"/>
-              <a:t>‘</a:t>
-            </a:r>
-            <a:r>
-              <a:rPr lang="en-US" sz="2900" dirty="0" err="1"/>
-              <a:t>std_price_norm</a:t>
-            </a:r>
-            <a:r>
-              <a:rPr lang="en-US" sz="2900" dirty="0"/>
-              <a:t>’:  adjusting the prices (depending on demand) increases the revenue</a:t>
-            </a:r>
-          </a:p>
-          <a:p>
-            <a:pPr lvl="1"/>
-            <a:r>
-              <a:rPr lang="en-US" sz="2900" dirty="0"/>
-              <a:t>‘</a:t>
-            </a:r>
-            <a:r>
-              <a:rPr lang="en-US" sz="2900" dirty="0" err="1"/>
-              <a:t>room_type</a:t>
-            </a:r>
-            <a:r>
-              <a:rPr lang="en-US" sz="2900" dirty="0"/>
-              <a:t>’:  renting whole houses and private rooms bring larger revenue than shared rooms</a:t>
-            </a:r>
-          </a:p>
-          <a:p>
-            <a:pPr lvl="1"/>
-            <a:r>
-              <a:rPr lang="en-US" sz="2900" dirty="0"/>
-              <a:t>‘</a:t>
-            </a:r>
-            <a:r>
-              <a:rPr lang="en-US" sz="2900" dirty="0" err="1"/>
-              <a:t>extra_guest_fraction</a:t>
-            </a:r>
-            <a:r>
-              <a:rPr lang="en-US" sz="2900" dirty="0"/>
-              <a:t>’: too many extra guests  have negative effect on revenue</a:t>
-            </a:r>
-          </a:p>
-          <a:p>
-            <a:pPr lvl="1"/>
-            <a:r>
-              <a:rPr lang="en-US" sz="2800" dirty="0"/>
-              <a:t>‘experience’:  host’s experience increases the revenue</a:t>
-            </a:r>
-          </a:p>
-          <a:p>
-            <a:pPr lvl="1"/>
-            <a:r>
-              <a:rPr lang="en-US" sz="2800" dirty="0"/>
-              <a:t>‘</a:t>
-            </a:r>
-            <a:r>
-              <a:rPr lang="en-US" sz="2800" dirty="0" err="1"/>
-              <a:t>bathrooms_per_bedroom</a:t>
-            </a:r>
-            <a:r>
-              <a:rPr lang="en-US" sz="2800" dirty="0"/>
-              <a:t>’:  more than one bathroom per bedroom decreases the revenue</a:t>
-            </a:r>
-          </a:p>
-          <a:p>
-            <a:pPr lvl="1"/>
-            <a:r>
-              <a:rPr lang="en-US" sz="2800" dirty="0"/>
-              <a:t>‘cancellation policy’:  strict cancellation policy increases the revenue</a:t>
-            </a:r>
-          </a:p>
-        </p:txBody>
-      </p:sp>
-      <p:pic>
-        <p:nvPicPr>
-          <p:cNvPr id="6146" name="Picture 2">
-            <a:extLst>
-              <a:ext uri="{FF2B5EF4-FFF2-40B4-BE49-F238E27FC236}">
-                <a16:creationId xmlns:a16="http://schemas.microsoft.com/office/drawing/2014/main" id="{1DFDB713-2F0E-47F0-946A-595CB2CD76C3}"/>
+                <a16:creationId xmlns:a16="http://schemas.microsoft.com/office/drawing/2014/main" id="{C4618ED7-5AF4-47E5-AE5F-52FFE178F3B6}"/>
               </a:ext>
             </a:extLst>
           </p:cNvPr>
@@ -5267,22 +5694,21 @@
           </p:nvPr>
         </p:nvPicPr>
         <p:blipFill>
-          <a:blip r:embed="rId3">
+          <a:blip r:embed="rId2">
             <a:extLst>
               <a:ext uri="{28A0092B-C50C-407E-A947-70E740481C1C}">
                 <a14:useLocalDpi xmlns:a14="http://schemas.microsoft.com/office/drawing/2010/main" val="0"/>
               </a:ext>
             </a:extLst>
           </a:blip>
-          <a:srcRect/>
           <a:stretch>
             <a:fillRect/>
           </a:stretch>
         </p:blipFill>
         <p:spPr bwMode="auto">
           <a:xfrm>
-            <a:off x="-13998" y="2177844"/>
-            <a:ext cx="6136502" cy="4666904"/>
+            <a:off x="475488" y="1965960"/>
+            <a:ext cx="8223720" cy="4754880"/>
           </a:xfrm>
           <a:prstGeom prst="rect">
             <a:avLst/>
@@ -5299,10 +5725,77 @@
           </a:extLst>
         </p:spPr>
       </p:pic>
+      <p:sp>
+        <p:nvSpPr>
+          <p:cNvPr id="5" name="Content Placeholder 4">
+            <a:extLst>
+              <a:ext uri="{FF2B5EF4-FFF2-40B4-BE49-F238E27FC236}">
+                <a16:creationId xmlns:a16="http://schemas.microsoft.com/office/drawing/2014/main" id="{7935AF6B-E576-4D66-9AF0-51940DB3534A}"/>
+              </a:ext>
+            </a:extLst>
+          </p:cNvPr>
+          <p:cNvSpPr>
+            <a:spLocks noGrp="1"/>
+          </p:cNvSpPr>
+          <p:nvPr>
+            <p:ph sz="half" idx="2"/>
+          </p:nvPr>
+        </p:nvSpPr>
+        <p:spPr>
+          <a:xfrm>
+            <a:off x="8719930" y="2266391"/>
+            <a:ext cx="3326295" cy="4168756"/>
+          </a:xfrm>
+        </p:spPr>
+        <p:txBody>
+          <a:bodyPr>
+            <a:normAutofit fontScale="70000" lnSpcReduction="20000"/>
+          </a:bodyPr>
+          <a:lstStyle/>
+          <a:p>
+            <a:r>
+              <a:rPr lang="en-US" dirty="0"/>
+              <a:t>The highest priced neighborhoods are </a:t>
+            </a:r>
+            <a:r>
+              <a:rPr lang="en-US" dirty="0" err="1"/>
+              <a:t>Interbay</a:t>
+            </a:r>
+            <a:r>
+              <a:rPr lang="en-US" dirty="0"/>
+              <a:t>, Downtown, and Queen Anne</a:t>
+            </a:r>
+          </a:p>
+          <a:p>
+            <a:endParaRPr lang="en-US" dirty="0"/>
+          </a:p>
+          <a:p>
+            <a:r>
+              <a:rPr lang="en-US" dirty="0"/>
+              <a:t>The highest-priced property types are Boats, Treehouses, and Bed &amp; Breakfast. </a:t>
+            </a:r>
+          </a:p>
+          <a:p>
+            <a:endParaRPr lang="en-US" dirty="0"/>
+          </a:p>
+          <a:p>
+            <a:r>
+              <a:rPr lang="en-US" dirty="0"/>
+              <a:t>Typical costs (per person) for houses, apartments, and condominiums are in 40 to 50$ range.</a:t>
+            </a:r>
+          </a:p>
+          <a:p>
+            <a:pPr marL="0" indent="0">
+              <a:buNone/>
+            </a:pPr>
+            <a:endParaRPr lang="en-US" dirty="0"/>
+          </a:p>
+        </p:txBody>
+      </p:sp>
     </p:spTree>
     <p:extLst>
       <p:ext uri="{BB962C8B-B14F-4D97-AF65-F5344CB8AC3E}">
-        <p14:creationId xmlns:p14="http://schemas.microsoft.com/office/powerpoint/2010/main" val="2059797988"/>
+        <p14:creationId xmlns:p14="http://schemas.microsoft.com/office/powerpoint/2010/main" val="3553335047"/>
       </p:ext>
     </p:extLst>
   </p:cSld>
@@ -5334,7 +5827,7 @@
           <p:cNvPr id="2" name="Title 1">
             <a:extLst>
               <a:ext uri="{FF2B5EF4-FFF2-40B4-BE49-F238E27FC236}">
-                <a16:creationId xmlns:a16="http://schemas.microsoft.com/office/drawing/2014/main" id="{0691FDD3-838B-4F2B-A0E7-2F82B7AF0BEB}"/>
+                <a16:creationId xmlns:a16="http://schemas.microsoft.com/office/drawing/2014/main" id="{303814A4-B9C1-47B2-9B44-06D52ED36EA0}"/>
               </a:ext>
             </a:extLst>
           </p:cNvPr>
@@ -5352,7 +5845,7 @@
           <a:p>
             <a:r>
               <a:rPr lang="en-US" dirty="0"/>
-              <a:t>A SAMPLE of model predictions</a:t>
+              <a:t>TYPICAL ACCOMMODATION SIZE</a:t>
             </a:r>
           </a:p>
         </p:txBody>
@@ -5362,7 +5855,7 @@
           <p:cNvPr id="4" name="Content Placeholder 3">
             <a:extLst>
               <a:ext uri="{FF2B5EF4-FFF2-40B4-BE49-F238E27FC236}">
-                <a16:creationId xmlns:a16="http://schemas.microsoft.com/office/drawing/2014/main" id="{2D0ACFE5-497C-4B59-B7C1-0FF00B7722D9}"/>
+                <a16:creationId xmlns:a16="http://schemas.microsoft.com/office/drawing/2014/main" id="{9305E049-BD6B-4E1D-AA83-66C91E0D209A}"/>
               </a:ext>
             </a:extLst>
           </p:cNvPr>
@@ -5370,13 +5863,13 @@
             <a:spLocks noGrp="1"/>
           </p:cNvSpPr>
           <p:nvPr>
-            <p:ph idx="1"/>
+            <p:ph sz="half" idx="2"/>
           </p:nvPr>
         </p:nvSpPr>
         <p:spPr>
           <a:xfrm>
-            <a:off x="581193" y="2021470"/>
-            <a:ext cx="11029615" cy="4677504"/>
+            <a:off x="8723376" y="2267712"/>
+            <a:ext cx="3328416" cy="4169664"/>
           </a:xfrm>
         </p:spPr>
         <p:txBody>
@@ -5385,113 +5878,84 @@
           </a:bodyPr>
           <a:lstStyle/>
           <a:p>
-            <a:pPr>
-              <a:buFont typeface="Arial" panose="020B0604020202020204" pitchFamily="34" charset="0"/>
-              <a:buChar char="•"/>
+            <a:r>
+              <a:rPr lang="en-US" sz="2000" dirty="0"/>
+              <a:t>Hosts in Magnolia, West Seattle, and Seward Park neighborhoods tend to offer larger accommodation rentals</a:t>
+            </a:r>
+          </a:p>
+          <a:p>
+            <a:pPr marL="0" indent="0">
+              <a:buNone/>
             </a:pPr>
-            <a:r>
-              <a:rPr lang="en-US" sz="2400" dirty="0"/>
-              <a:t>One person apartment in Downtown area: </a:t>
-            </a:r>
+            <a:endParaRPr lang="en-US" sz="2000" dirty="0"/>
+          </a:p>
+          <a:p>
             <a:r>
               <a:rPr lang="en-US" sz="2000" dirty="0"/>
-              <a:t>$50 per guest typical price,  $11 extra people fee</a:t>
-            </a:r>
-          </a:p>
-          <a:p>
-            <a:pPr lvl="1">
-              <a:buFont typeface="Arial" panose="020B0604020202020204" pitchFamily="34" charset="0"/>
-              <a:buChar char="•"/>
-            </a:pPr>
-            <a:r>
-              <a:rPr lang="en-US" sz="2000" dirty="0"/>
-              <a:t>$32 expected daily revenue</a:t>
-            </a:r>
-          </a:p>
-          <a:p>
-            <a:pPr lvl="1">
-              <a:buFont typeface="Arial" panose="020B0604020202020204" pitchFamily="34" charset="0"/>
-              <a:buChar char="•"/>
-            </a:pPr>
-            <a:r>
-              <a:rPr lang="en-US" sz="2000" dirty="0"/>
-              <a:t>45% expected daily booking rate</a:t>
-            </a:r>
-          </a:p>
-          <a:p>
-            <a:pPr>
-              <a:buFont typeface="Arial" panose="020B0604020202020204" pitchFamily="34" charset="0"/>
-              <a:buChar char="•"/>
-            </a:pPr>
-            <a:r>
-              <a:rPr lang="en-US" sz="2400" dirty="0"/>
-              <a:t>Two person house in Lake City: </a:t>
-            </a:r>
-            <a:r>
-              <a:rPr lang="en-US" sz="2000" dirty="0"/>
-              <a:t>$40 per guest typical price,  $14 extra people fee</a:t>
-            </a:r>
-          </a:p>
-          <a:p>
-            <a:pPr lvl="1">
-              <a:buFont typeface="Arial" panose="020B0604020202020204" pitchFamily="34" charset="0"/>
-              <a:buChar char="•"/>
-            </a:pPr>
-            <a:r>
-              <a:rPr lang="en-US" sz="2000" dirty="0"/>
-              <a:t>$52 expected daily revenue</a:t>
-            </a:r>
-          </a:p>
-          <a:p>
-            <a:pPr lvl="1">
-              <a:buFont typeface="Arial" panose="020B0604020202020204" pitchFamily="34" charset="0"/>
-              <a:buChar char="•"/>
-            </a:pPr>
-            <a:r>
-              <a:rPr lang="en-US" sz="2000" dirty="0"/>
-              <a:t>79% expected daily booking rate</a:t>
-            </a:r>
-          </a:p>
-          <a:p>
-            <a:pPr>
-              <a:buFont typeface="Arial" panose="020B0604020202020204" pitchFamily="34" charset="0"/>
-              <a:buChar char="•"/>
-            </a:pPr>
-            <a:r>
-              <a:rPr lang="en-US" sz="2400" dirty="0"/>
-              <a:t>Four person house in Magnolia:  </a:t>
-            </a:r>
-            <a:r>
-              <a:rPr lang="en-US" sz="2000" dirty="0"/>
-              <a:t>$35 per guest typical price, $13 for extra people fee</a:t>
-            </a:r>
-          </a:p>
-          <a:p>
-            <a:pPr lvl="1">
-              <a:buFont typeface="Arial" panose="020B0604020202020204" pitchFamily="34" charset="0"/>
-              <a:buChar char="•"/>
-            </a:pPr>
-            <a:r>
-              <a:rPr lang="en-US" sz="2000" dirty="0"/>
-              <a:t>$94 expected daily revenue</a:t>
-            </a:r>
-          </a:p>
-          <a:p>
-            <a:pPr lvl="1">
-              <a:buFont typeface="Arial" panose="020B0604020202020204" pitchFamily="34" charset="0"/>
-              <a:buChar char="•"/>
-            </a:pPr>
-            <a:r>
-              <a:rPr lang="en-US" sz="2000" dirty="0"/>
-              <a:t>66% expected daily booking rate</a:t>
-            </a:r>
-          </a:p>
-        </p:txBody>
-      </p:sp>
+              <a:t>Houses, townhouses, and condominiums accommodate the most people</a:t>
+            </a:r>
+          </a:p>
+          <a:p>
+            <a:endParaRPr lang="en-US" sz="2000" dirty="0"/>
+          </a:p>
+          <a:p>
+            <a:endParaRPr lang="en-US" sz="2000" dirty="0"/>
+          </a:p>
+        </p:txBody>
+      </p:sp>
+      <p:pic>
+        <p:nvPicPr>
+          <p:cNvPr id="2050" name="Picture 2">
+            <a:extLst>
+              <a:ext uri="{FF2B5EF4-FFF2-40B4-BE49-F238E27FC236}">
+                <a16:creationId xmlns:a16="http://schemas.microsoft.com/office/drawing/2014/main" id="{821AE6AE-FDF2-4C93-869C-6EB05A61A13E}"/>
+              </a:ext>
+            </a:extLst>
+          </p:cNvPr>
+          <p:cNvPicPr>
+            <a:picLocks noGrp="1" noChangeAspect="1" noChangeArrowheads="1"/>
+          </p:cNvPicPr>
+          <p:nvPr>
+            <p:ph sz="half" idx="1"/>
+          </p:nvPr>
+        </p:nvPicPr>
+        <p:blipFill>
+          <a:blip r:embed="rId2">
+            <a:extLst>
+              <a:ext uri="{28A0092B-C50C-407E-A947-70E740481C1C}">
+                <a14:useLocalDpi xmlns:a14="http://schemas.microsoft.com/office/drawing/2010/main" val="0"/>
+              </a:ext>
+            </a:extLst>
+          </a:blip>
+          <a:srcRect/>
+          <a:stretch>
+            <a:fillRect/>
+          </a:stretch>
+        </p:blipFill>
+        <p:spPr bwMode="auto">
+          <a:xfrm>
+            <a:off x="475006" y="1962090"/>
+            <a:ext cx="8226975" cy="4756763"/>
+          </a:xfrm>
+          <a:prstGeom prst="rect">
+            <a:avLst/>
+          </a:prstGeom>
+          <a:noFill/>
+          <a:extLst>
+            <a:ext uri="{909E8E84-426E-40DD-AFC4-6F175D3DCCD1}">
+              <a14:hiddenFill xmlns:a14="http://schemas.microsoft.com/office/drawing/2010/main">
+                <a:solidFill>
+                  <a:srgbClr val="FFFFFF"/>
+                </a:solidFill>
+              </a14:hiddenFill>
+            </a:ext>
+          </a:extLst>
+        </p:spPr>
+      </p:pic>
     </p:spTree>
     <p:extLst>
       <p:ext uri="{BB962C8B-B14F-4D97-AF65-F5344CB8AC3E}">
-        <p14:creationId xmlns:p14="http://schemas.microsoft.com/office/powerpoint/2010/main" val="1195710726"/>
+        <p14:creationId xmlns:p14="http://schemas.microsoft.com/office/powerpoint/2010/main" val="2054340729"/>
       </p:ext>
     </p:extLst>
   </p:cSld>
@@ -5523,7 +5987,7 @@
           <p:cNvPr id="2" name="Title 1">
             <a:extLst>
               <a:ext uri="{FF2B5EF4-FFF2-40B4-BE49-F238E27FC236}">
-                <a16:creationId xmlns:a16="http://schemas.microsoft.com/office/drawing/2014/main" id="{C8013EEC-65BE-464C-B900-E09510E6AB4C}"/>
+                <a16:creationId xmlns:a16="http://schemas.microsoft.com/office/drawing/2014/main" id="{B16818F0-06BE-4EE3-BB24-5E8597056BFF}"/>
               </a:ext>
             </a:extLst>
           </p:cNvPr>
@@ -5541,17 +6005,17 @@
           <a:p>
             <a:r>
               <a:rPr lang="en-US" dirty="0"/>
-              <a:t>Summary</a:t>
-            </a:r>
-          </a:p>
-        </p:txBody>
-      </p:sp>
-      <p:sp>
-        <p:nvSpPr>
-          <p:cNvPr id="3" name="Content Placeholder 2">
+              <a:t>Typical revenue and booking rate</a:t>
+            </a:r>
+          </a:p>
+        </p:txBody>
+      </p:sp>
+      <p:sp>
+        <p:nvSpPr>
+          <p:cNvPr id="4" name="Content Placeholder 3">
             <a:extLst>
               <a:ext uri="{FF2B5EF4-FFF2-40B4-BE49-F238E27FC236}">
-                <a16:creationId xmlns:a16="http://schemas.microsoft.com/office/drawing/2014/main" id="{A443B0B5-E40F-41C5-8A59-48C4E08209D8}"/>
+                <a16:creationId xmlns:a16="http://schemas.microsoft.com/office/drawing/2014/main" id="{995CBE9E-986F-4194-A6BB-4BDEDCB634E0}"/>
               </a:ext>
             </a:extLst>
           </p:cNvPr>
@@ -5559,44 +6023,142 @@
             <a:spLocks noGrp="1"/>
           </p:cNvSpPr>
           <p:nvPr>
-            <p:ph idx="1"/>
+            <p:ph sz="half" idx="2"/>
           </p:nvPr>
         </p:nvSpPr>
         <p:spPr>
           <a:xfrm>
-            <a:off x="581192" y="2180496"/>
-            <a:ext cx="11029615" cy="4127539"/>
+            <a:off x="7611024" y="2412614"/>
+            <a:ext cx="4135496" cy="4213269"/>
           </a:xfrm>
         </p:spPr>
         <p:txBody>
           <a:bodyPr>
-            <a:normAutofit fontScale="92500" lnSpcReduction="20000"/>
+            <a:normAutofit fontScale="62500" lnSpcReduction="20000"/>
           </a:bodyPr>
           <a:lstStyle/>
           <a:p>
             <a:r>
               <a:rPr lang="en-US" dirty="0"/>
-              <a:t>The revenue decreases around Christmas, New Year, Easter, and the Fourth of July.  Market prices surge and the revenue increases during the summer, when there is an increased demand for the Airbnb hosts due to the increased number of people taking vacations. </a:t>
-            </a:r>
-          </a:p>
-          <a:p>
-            <a:r>
-              <a:rPr lang="en-US" dirty="0"/>
-              <a:t>Higher guest prices, larger accommodations, stricter cancellation policies, and larger fees for extra guests all increase the revenue.  Price per customer and the number of people accommodated are the most important predictors. Price adjustments (depending on the demand) increase the revenue also.</a:t>
-            </a:r>
-          </a:p>
-          <a:p>
-            <a:r>
-              <a:rPr lang="en-US" dirty="0"/>
-              <a:t>The revenue and the booking rate models provide forecasts of the expected daily revenue and the booking rate for specified host's property attributes, pricing, policies, and location.  </a:t>
-            </a:r>
-          </a:p>
-        </p:txBody>
-      </p:sp>
+              <a:t>Properties in Magnolia, Downtown, and Queen Anne neighborhoods draw largest revenue</a:t>
+            </a:r>
+          </a:p>
+          <a:p>
+            <a:r>
+              <a:rPr lang="en-US" dirty="0"/>
+              <a:t>Rooms on boats collect the largest revenue</a:t>
+            </a:r>
+          </a:p>
+          <a:p>
+            <a:r>
+              <a:rPr lang="en-US" dirty="0"/>
+              <a:t>Most other property types draw similar revenues, with condominiums, houses, Camper/RVs, apartments being on the higher side</a:t>
+            </a:r>
+          </a:p>
+          <a:p>
+            <a:r>
+              <a:rPr lang="en-US" dirty="0"/>
+              <a:t>Cabins and treehouses produce considerably  smaller average daily revenues  than other properties.  This is likely due to the high seasonal dependence of the demand for such properties.</a:t>
+            </a:r>
+          </a:p>
+        </p:txBody>
+      </p:sp>
+      <p:pic>
+        <p:nvPicPr>
+          <p:cNvPr id="5" name="Picture 2">
+            <a:extLst>
+              <a:ext uri="{FF2B5EF4-FFF2-40B4-BE49-F238E27FC236}">
+                <a16:creationId xmlns:a16="http://schemas.microsoft.com/office/drawing/2014/main" id="{56E22A04-10EB-424F-8356-415EC8C6FD18}"/>
+              </a:ext>
+            </a:extLst>
+          </p:cNvPr>
+          <p:cNvPicPr>
+            <a:picLocks noGrp="1" noChangeAspect="1" noChangeArrowheads="1"/>
+          </p:cNvPicPr>
+          <p:nvPr>
+            <p:ph sz="half" idx="1"/>
+          </p:nvPr>
+        </p:nvPicPr>
+        <p:blipFill rotWithShape="1">
+          <a:blip r:embed="rId2">
+            <a:extLst>
+              <a:ext uri="{28A0092B-C50C-407E-A947-70E740481C1C}">
+                <a14:useLocalDpi xmlns:a14="http://schemas.microsoft.com/office/drawing/2010/main" val="0"/>
+              </a:ext>
+            </a:extLst>
+          </a:blip>
+          <a:srcRect r="38402"/>
+          <a:stretch/>
+        </p:blipFill>
+        <p:spPr bwMode="auto">
+          <a:xfrm>
+            <a:off x="581193" y="1911800"/>
+            <a:ext cx="3062340" cy="4971469"/>
+          </a:xfrm>
+          <a:prstGeom prst="rect">
+            <a:avLst/>
+          </a:prstGeom>
+          <a:noFill/>
+          <a:extLst>
+            <a:ext uri="{909E8E84-426E-40DD-AFC4-6F175D3DCCD1}">
+              <a14:hiddenFill xmlns:a14="http://schemas.microsoft.com/office/drawing/2010/main">
+                <a:solidFill>
+                  <a:srgbClr val="FFFFFF"/>
+                </a:solidFill>
+              </a14:hiddenFill>
+            </a:ext>
+          </a:extLst>
+        </p:spPr>
+      </p:pic>
+      <p:pic>
+        <p:nvPicPr>
+          <p:cNvPr id="5122" name="Picture 2">
+            <a:extLst>
+              <a:ext uri="{FF2B5EF4-FFF2-40B4-BE49-F238E27FC236}">
+                <a16:creationId xmlns:a16="http://schemas.microsoft.com/office/drawing/2014/main" id="{D6B46125-0BB3-48CD-AE6A-A1675B715B04}"/>
+              </a:ext>
+            </a:extLst>
+          </p:cNvPr>
+          <p:cNvPicPr>
+            <a:picLocks noChangeAspect="1" noChangeArrowheads="1"/>
+          </p:cNvPicPr>
+          <p:nvPr/>
+        </p:nvPicPr>
+        <p:blipFill rotWithShape="1">
+          <a:blip r:embed="rId3">
+            <a:extLst>
+              <a:ext uri="{28A0092B-C50C-407E-A947-70E740481C1C}">
+                <a14:useLocalDpi xmlns:a14="http://schemas.microsoft.com/office/drawing/2010/main" val="0"/>
+              </a:ext>
+            </a:extLst>
+          </a:blip>
+          <a:srcRect r="41818"/>
+          <a:stretch/>
+        </p:blipFill>
+        <p:spPr bwMode="auto">
+          <a:xfrm>
+            <a:off x="3991142" y="1920133"/>
+            <a:ext cx="3137131" cy="4208209"/>
+          </a:xfrm>
+          <a:prstGeom prst="rect">
+            <a:avLst/>
+          </a:prstGeom>
+          <a:noFill/>
+          <a:extLst>
+            <a:ext uri="{909E8E84-426E-40DD-AFC4-6F175D3DCCD1}">
+              <a14:hiddenFill xmlns:a14="http://schemas.microsoft.com/office/drawing/2010/main">
+                <a:solidFill>
+                  <a:srgbClr val="FFFFFF"/>
+                </a:solidFill>
+              </a14:hiddenFill>
+            </a:ext>
+          </a:extLst>
+        </p:spPr>
+      </p:pic>
     </p:spTree>
     <p:extLst>
       <p:ext uri="{BB962C8B-B14F-4D97-AF65-F5344CB8AC3E}">
-        <p14:creationId xmlns:p14="http://schemas.microsoft.com/office/powerpoint/2010/main" val="3133424421"/>
+        <p14:creationId xmlns:p14="http://schemas.microsoft.com/office/powerpoint/2010/main" val="398236197"/>
       </p:ext>
     </p:extLst>
   </p:cSld>

</xml_diff>

<commit_message>
updating error bars on the feature importance plots and adding numbers for the regression plots
</commit_message>
<xml_diff>
--- a/Seattle_Airbnb_2017_DI.pptx
+++ b/Seattle_Airbnb_2017_DI.pptx
@@ -10,10 +10,10 @@
     <p:sldId id="258" r:id="rId4"/>
     <p:sldId id="259" r:id="rId5"/>
     <p:sldId id="260" r:id="rId6"/>
-    <p:sldId id="262" r:id="rId7"/>
-    <p:sldId id="266" r:id="rId8"/>
-    <p:sldId id="267" r:id="rId9"/>
-    <p:sldId id="269" r:id="rId10"/>
+    <p:sldId id="266" r:id="rId7"/>
+    <p:sldId id="267" r:id="rId8"/>
+    <p:sldId id="269" r:id="rId9"/>
+    <p:sldId id="262" r:id="rId10"/>
     <p:sldId id="263" r:id="rId11"/>
     <p:sldId id="264" r:id="rId12"/>
     <p:sldId id="265" r:id="rId13"/>
@@ -369,7 +369,7 @@
             <a:fld id="{B61BEF0D-F0BB-DE4B-95CE-6DB70DBA9567}" type="datetimeFigureOut">
               <a:rPr lang="en-US" dirty="0"/>
               <a:pPr/>
-              <a:t>4/7/2021</a:t>
+              <a:t>4/8/2021</a:t>
             </a:fld>
             <a:endParaRPr lang="en-US" dirty="0"/>
           </a:p>
@@ -628,7 +628,7 @@
             <a:fld id="{B61BEF0D-F0BB-DE4B-95CE-6DB70DBA9567}" type="datetimeFigureOut">
               <a:rPr lang="en-US" dirty="0"/>
               <a:pPr/>
-              <a:t>4/7/2021</a:t>
+              <a:t>4/8/2021</a:t>
             </a:fld>
             <a:endParaRPr lang="en-US" dirty="0"/>
           </a:p>
@@ -860,7 +860,7 @@
             <a:fld id="{B61BEF0D-F0BB-DE4B-95CE-6DB70DBA9567}" type="datetimeFigureOut">
               <a:rPr lang="en-US" dirty="0"/>
               <a:pPr/>
-              <a:t>4/7/2021</a:t>
+              <a:t>4/8/2021</a:t>
             </a:fld>
             <a:endParaRPr lang="en-US" dirty="0"/>
           </a:p>
@@ -1114,7 +1114,7 @@
             <a:fld id="{B61BEF0D-F0BB-DE4B-95CE-6DB70DBA9567}" type="datetimeFigureOut">
               <a:rPr lang="en-US" dirty="0"/>
               <a:pPr/>
-              <a:t>4/7/2021</a:t>
+              <a:t>4/8/2021</a:t>
             </a:fld>
             <a:endParaRPr lang="en-US" dirty="0"/>
           </a:p>
@@ -1418,7 +1418,7 @@
             <a:fld id="{B61BEF0D-F0BB-DE4B-95CE-6DB70DBA9567}" type="datetimeFigureOut">
               <a:rPr lang="en-US" dirty="0"/>
               <a:pPr/>
-              <a:t>4/7/2021</a:t>
+              <a:t>4/8/2021</a:t>
             </a:fld>
             <a:endParaRPr lang="en-US" dirty="0"/>
           </a:p>
@@ -1747,7 +1747,7 @@
             <a:fld id="{B61BEF0D-F0BB-DE4B-95CE-6DB70DBA9567}" type="datetimeFigureOut">
               <a:rPr lang="en-US" dirty="0"/>
               <a:pPr/>
-              <a:t>4/7/2021</a:t>
+              <a:t>4/8/2021</a:t>
             </a:fld>
             <a:endParaRPr lang="en-US" dirty="0"/>
           </a:p>
@@ -2196,7 +2196,7 @@
             <a:fld id="{B61BEF0D-F0BB-DE4B-95CE-6DB70DBA9567}" type="datetimeFigureOut">
               <a:rPr lang="en-US" dirty="0"/>
               <a:pPr/>
-              <a:t>4/7/2021</a:t>
+              <a:t>4/8/2021</a:t>
             </a:fld>
             <a:endParaRPr lang="en-US" dirty="0"/>
           </a:p>
@@ -2355,7 +2355,7 @@
             <a:fld id="{B61BEF0D-F0BB-DE4B-95CE-6DB70DBA9567}" type="datetimeFigureOut">
               <a:rPr lang="en-US" dirty="0"/>
               <a:pPr/>
-              <a:t>4/7/2021</a:t>
+              <a:t>4/8/2021</a:t>
             </a:fld>
             <a:endParaRPr lang="en-US" dirty="0"/>
           </a:p>
@@ -2447,7 +2447,7 @@
             <a:fld id="{B61BEF0D-F0BB-DE4B-95CE-6DB70DBA9567}" type="datetimeFigureOut">
               <a:rPr lang="en-US" dirty="0"/>
               <a:pPr/>
-              <a:t>4/7/2021</a:t>
+              <a:t>4/8/2021</a:t>
             </a:fld>
             <a:endParaRPr lang="en-US" dirty="0"/>
           </a:p>
@@ -2821,7 +2821,7 @@
             <a:fld id="{B61BEF0D-F0BB-DE4B-95CE-6DB70DBA9567}" type="datetimeFigureOut">
               <a:rPr lang="en-US" dirty="0"/>
               <a:pPr/>
-              <a:t>4/7/2021</a:t>
+              <a:t>4/8/2021</a:t>
             </a:fld>
             <a:endParaRPr lang="en-US" dirty="0"/>
           </a:p>
@@ -3106,7 +3106,7 @@
             <a:fld id="{B61BEF0D-F0BB-DE4B-95CE-6DB70DBA9567}" type="datetimeFigureOut">
               <a:rPr lang="en-US" dirty="0"/>
               <a:pPr/>
-              <a:t>4/7/2021</a:t>
+              <a:t>4/8/2021</a:t>
             </a:fld>
             <a:endParaRPr lang="en-US" dirty="0"/>
           </a:p>
@@ -3314,7 +3314,7 @@
             <a:fld id="{B61BEF0D-F0BB-DE4B-95CE-6DB70DBA9567}" type="datetimeFigureOut">
               <a:rPr lang="en-US" dirty="0"/>
               <a:pPr/>
-              <a:t>4/7/2021</a:t>
+              <a:t>4/8/2021</a:t>
             </a:fld>
             <a:endParaRPr lang="en-US" dirty="0"/>
           </a:p>
@@ -4079,7 +4079,7 @@
           <a:p>
             <a:r>
               <a:rPr lang="en-US" dirty="0"/>
-              <a:t>RELATIVE IMPORTANCE OF  the FACTORS</a:t>
+              <a:t>OTHER FACTORS</a:t>
             </a:r>
           </a:p>
         </p:txBody>
@@ -4124,15 +4124,7 @@
             </a:r>
             <a:r>
               <a:rPr lang="en-US" sz="2900" dirty="0"/>
-              <a:t> model on listing and booking data to predicts the revenue and </a:t>
-            </a:r>
-            <a:r>
-              <a:rPr lang="en-US" sz="2900" dirty="0" err="1"/>
-              <a:t>ro</a:t>
-            </a:r>
-            <a:r>
-              <a:rPr lang="en-US" sz="2900" dirty="0"/>
-              <a:t> unravel the relative importance of the features:</a:t>
+              <a:t> model on listing and booking data to predicts the revenue and to unravel the relative importance of the features:</a:t>
             </a:r>
           </a:p>
           <a:p>
@@ -4228,10 +4220,10 @@
       </p:sp>
       <p:pic>
         <p:nvPicPr>
-          <p:cNvPr id="6146" name="Picture 2">
+          <p:cNvPr id="11" name="Picture 2">
             <a:extLst>
               <a:ext uri="{FF2B5EF4-FFF2-40B4-BE49-F238E27FC236}">
-                <a16:creationId xmlns:a16="http://schemas.microsoft.com/office/drawing/2014/main" id="{1DFDB713-2F0E-47F0-946A-595CB2CD76C3}"/>
+                <a16:creationId xmlns:a16="http://schemas.microsoft.com/office/drawing/2014/main" id="{C088FB34-C4E4-49C3-BA0D-3E3C0DF191F2}"/>
               </a:ext>
             </a:extLst>
           </p:cNvPr>
@@ -4257,8 +4249,8 @@
         </p:blipFill>
         <p:spPr bwMode="auto">
           <a:xfrm>
-            <a:off x="-13998" y="2177844"/>
-            <a:ext cx="6136502" cy="4666904"/>
+            <a:off x="0" y="2191096"/>
+            <a:ext cx="6326609" cy="4630737"/>
           </a:xfrm>
           <a:prstGeom prst="rect">
             <a:avLst/>
@@ -4278,7 +4270,7 @@
     </p:spTree>
     <p:extLst>
       <p:ext uri="{BB962C8B-B14F-4D97-AF65-F5344CB8AC3E}">
-        <p14:creationId xmlns:p14="http://schemas.microsoft.com/office/powerpoint/2010/main" val="2059797988"/>
+        <p14:creationId xmlns:p14="http://schemas.microsoft.com/office/powerpoint/2010/main" val="3107873642"/>
       </p:ext>
     </p:extLst>
   </p:cSld>
@@ -4328,7 +4320,7 @@
           <a:p>
             <a:r>
               <a:rPr lang="en-US" dirty="0"/>
-              <a:t>A SAMPLE of model predictions</a:t>
+              <a:t>A sample of model predictions</a:t>
             </a:r>
           </a:p>
         </p:txBody>
@@ -5505,10 +5497,10 @@
       </p:grpSpPr>
       <p:sp>
         <p:nvSpPr>
-          <p:cNvPr id="2" name="Title 1">
+          <p:cNvPr id="4" name="Title 3">
             <a:extLst>
               <a:ext uri="{FF2B5EF4-FFF2-40B4-BE49-F238E27FC236}">
-                <a16:creationId xmlns:a16="http://schemas.microsoft.com/office/drawing/2014/main" id="{55998238-E582-4A50-A58D-3EE341054F95}"/>
+                <a16:creationId xmlns:a16="http://schemas.microsoft.com/office/drawing/2014/main" id="{A4AE8447-D877-4CF1-8171-060F3350425C}"/>
               </a:ext>
             </a:extLst>
           </p:cNvPr>
@@ -5526,56 +5518,17 @@
           <a:p>
             <a:r>
               <a:rPr lang="en-US" dirty="0"/>
-              <a:t>PRICE and SIZE ARE IMPORTANT</a:t>
-            </a:r>
-          </a:p>
-        </p:txBody>
-      </p:sp>
-      <p:sp>
-        <p:nvSpPr>
-          <p:cNvPr id="4" name="Content Placeholder 3">
+              <a:t>Typical pricing</a:t>
+            </a:r>
+          </a:p>
+        </p:txBody>
+      </p:sp>
+      <p:pic>
+        <p:nvPicPr>
+          <p:cNvPr id="1026" name="Picture 2">
             <a:extLst>
               <a:ext uri="{FF2B5EF4-FFF2-40B4-BE49-F238E27FC236}">
-                <a16:creationId xmlns:a16="http://schemas.microsoft.com/office/drawing/2014/main" id="{5270B1CF-9DF3-4802-A864-538F08CFE5E7}"/>
-              </a:ext>
-            </a:extLst>
-          </p:cNvPr>
-          <p:cNvSpPr>
-            <a:spLocks noGrp="1"/>
-          </p:cNvSpPr>
-          <p:nvPr>
-            <p:ph sz="half" idx="2"/>
-          </p:nvPr>
-        </p:nvSpPr>
-        <p:spPr>
-          <a:xfrm>
-            <a:off x="1457740" y="5883965"/>
-            <a:ext cx="9623146" cy="844875"/>
-          </a:xfrm>
-        </p:spPr>
-        <p:txBody>
-          <a:bodyPr>
-            <a:normAutofit fontScale="92500" lnSpcReduction="10000"/>
-          </a:bodyPr>
-          <a:lstStyle/>
-          <a:p>
-            <a:r>
-              <a:rPr lang="en-US" dirty="0"/>
-              <a:t>Price per guest and the number of accommodated customers </a:t>
-            </a:r>
-            <a:r>
-              <a:rPr lang="en-US" b="1" dirty="0"/>
-              <a:t>correlate very strongly with the revenue</a:t>
-            </a:r>
-          </a:p>
-        </p:txBody>
-      </p:sp>
-      <p:pic>
-        <p:nvPicPr>
-          <p:cNvPr id="5122" name="Picture 2">
-            <a:extLst>
-              <a:ext uri="{FF2B5EF4-FFF2-40B4-BE49-F238E27FC236}">
-                <a16:creationId xmlns:a16="http://schemas.microsoft.com/office/drawing/2014/main" id="{23A64E6D-49E3-4E9E-B578-66D72DBDB69C}"/>
+                <a16:creationId xmlns:a16="http://schemas.microsoft.com/office/drawing/2014/main" id="{C4618ED7-5AF4-47E5-AE5F-52FFE178F3B6}"/>
               </a:ext>
             </a:extLst>
           </p:cNvPr>
@@ -5594,15 +5547,14 @@
               </a:ext>
             </a:extLst>
           </a:blip>
-          <a:srcRect/>
           <a:stretch>
             <a:fillRect/>
           </a:stretch>
         </p:blipFill>
         <p:spPr bwMode="auto">
           <a:xfrm>
-            <a:off x="1343894" y="2098149"/>
-            <a:ext cx="8125654" cy="3591142"/>
+            <a:off x="475488" y="1965960"/>
+            <a:ext cx="8223720" cy="4754880"/>
           </a:xfrm>
           <a:prstGeom prst="rect">
             <a:avLst/>
@@ -5619,10 +5571,77 @@
           </a:extLst>
         </p:spPr>
       </p:pic>
+      <p:sp>
+        <p:nvSpPr>
+          <p:cNvPr id="5" name="Content Placeholder 4">
+            <a:extLst>
+              <a:ext uri="{FF2B5EF4-FFF2-40B4-BE49-F238E27FC236}">
+                <a16:creationId xmlns:a16="http://schemas.microsoft.com/office/drawing/2014/main" id="{7935AF6B-E576-4D66-9AF0-51940DB3534A}"/>
+              </a:ext>
+            </a:extLst>
+          </p:cNvPr>
+          <p:cNvSpPr>
+            <a:spLocks noGrp="1"/>
+          </p:cNvSpPr>
+          <p:nvPr>
+            <p:ph sz="half" idx="2"/>
+          </p:nvPr>
+        </p:nvSpPr>
+        <p:spPr>
+          <a:xfrm>
+            <a:off x="8719930" y="2266391"/>
+            <a:ext cx="3326295" cy="4168756"/>
+          </a:xfrm>
+        </p:spPr>
+        <p:txBody>
+          <a:bodyPr>
+            <a:normAutofit fontScale="70000" lnSpcReduction="20000"/>
+          </a:bodyPr>
+          <a:lstStyle/>
+          <a:p>
+            <a:r>
+              <a:rPr lang="en-US" dirty="0"/>
+              <a:t>The highest priced neighborhoods are </a:t>
+            </a:r>
+            <a:r>
+              <a:rPr lang="en-US" dirty="0" err="1"/>
+              <a:t>Interbay</a:t>
+            </a:r>
+            <a:r>
+              <a:rPr lang="en-US" dirty="0"/>
+              <a:t>, Downtown, and Queen Anne</a:t>
+            </a:r>
+          </a:p>
+          <a:p>
+            <a:endParaRPr lang="en-US" dirty="0"/>
+          </a:p>
+          <a:p>
+            <a:r>
+              <a:rPr lang="en-US" dirty="0"/>
+              <a:t>The highest-priced property types are Boats, Treehouses, and Bed &amp; Breakfast. </a:t>
+            </a:r>
+          </a:p>
+          <a:p>
+            <a:endParaRPr lang="en-US" dirty="0"/>
+          </a:p>
+          <a:p>
+            <a:r>
+              <a:rPr lang="en-US" dirty="0"/>
+              <a:t>Typical costs (per person) for houses, apartments, and condominiums are in 40 to 50$ range.</a:t>
+            </a:r>
+          </a:p>
+          <a:p>
+            <a:pPr marL="0" indent="0">
+              <a:buNone/>
+            </a:pPr>
+            <a:endParaRPr lang="en-US" dirty="0"/>
+          </a:p>
+        </p:txBody>
+      </p:sp>
     </p:spTree>
     <p:extLst>
       <p:ext uri="{BB962C8B-B14F-4D97-AF65-F5344CB8AC3E}">
-        <p14:creationId xmlns:p14="http://schemas.microsoft.com/office/powerpoint/2010/main" val="1011594284"/>
+        <p14:creationId xmlns:p14="http://schemas.microsoft.com/office/powerpoint/2010/main" val="3553335047"/>
       </p:ext>
     </p:extLst>
   </p:cSld>
@@ -5651,179 +5670,6 @@
       </p:grpSpPr>
       <p:sp>
         <p:nvSpPr>
-          <p:cNvPr id="4" name="Title 3">
-            <a:extLst>
-              <a:ext uri="{FF2B5EF4-FFF2-40B4-BE49-F238E27FC236}">
-                <a16:creationId xmlns:a16="http://schemas.microsoft.com/office/drawing/2014/main" id="{A4AE8447-D877-4CF1-8171-060F3350425C}"/>
-              </a:ext>
-            </a:extLst>
-          </p:cNvPr>
-          <p:cNvSpPr>
-            <a:spLocks noGrp="1"/>
-          </p:cNvSpPr>
-          <p:nvPr>
-            <p:ph type="title"/>
-          </p:nvPr>
-        </p:nvSpPr>
-        <p:spPr/>
-        <p:txBody>
-          <a:bodyPr/>
-          <a:lstStyle/>
-          <a:p>
-            <a:r>
-              <a:rPr lang="en-US" dirty="0"/>
-              <a:t>Typical pricing</a:t>
-            </a:r>
-          </a:p>
-        </p:txBody>
-      </p:sp>
-      <p:pic>
-        <p:nvPicPr>
-          <p:cNvPr id="1026" name="Picture 2">
-            <a:extLst>
-              <a:ext uri="{FF2B5EF4-FFF2-40B4-BE49-F238E27FC236}">
-                <a16:creationId xmlns:a16="http://schemas.microsoft.com/office/drawing/2014/main" id="{C4618ED7-5AF4-47E5-AE5F-52FFE178F3B6}"/>
-              </a:ext>
-            </a:extLst>
-          </p:cNvPr>
-          <p:cNvPicPr>
-            <a:picLocks noGrp="1" noChangeAspect="1" noChangeArrowheads="1"/>
-          </p:cNvPicPr>
-          <p:nvPr>
-            <p:ph sz="half" idx="1"/>
-          </p:nvPr>
-        </p:nvPicPr>
-        <p:blipFill>
-          <a:blip r:embed="rId2">
-            <a:extLst>
-              <a:ext uri="{28A0092B-C50C-407E-A947-70E740481C1C}">
-                <a14:useLocalDpi xmlns:a14="http://schemas.microsoft.com/office/drawing/2010/main" val="0"/>
-              </a:ext>
-            </a:extLst>
-          </a:blip>
-          <a:stretch>
-            <a:fillRect/>
-          </a:stretch>
-        </p:blipFill>
-        <p:spPr bwMode="auto">
-          <a:xfrm>
-            <a:off x="475488" y="1965960"/>
-            <a:ext cx="8223720" cy="4754880"/>
-          </a:xfrm>
-          <a:prstGeom prst="rect">
-            <a:avLst/>
-          </a:prstGeom>
-          <a:noFill/>
-          <a:extLst>
-            <a:ext uri="{909E8E84-426E-40DD-AFC4-6F175D3DCCD1}">
-              <a14:hiddenFill xmlns:a14="http://schemas.microsoft.com/office/drawing/2010/main">
-                <a:solidFill>
-                  <a:srgbClr val="FFFFFF"/>
-                </a:solidFill>
-              </a14:hiddenFill>
-            </a:ext>
-          </a:extLst>
-        </p:spPr>
-      </p:pic>
-      <p:sp>
-        <p:nvSpPr>
-          <p:cNvPr id="5" name="Content Placeholder 4">
-            <a:extLst>
-              <a:ext uri="{FF2B5EF4-FFF2-40B4-BE49-F238E27FC236}">
-                <a16:creationId xmlns:a16="http://schemas.microsoft.com/office/drawing/2014/main" id="{7935AF6B-E576-4D66-9AF0-51940DB3534A}"/>
-              </a:ext>
-            </a:extLst>
-          </p:cNvPr>
-          <p:cNvSpPr>
-            <a:spLocks noGrp="1"/>
-          </p:cNvSpPr>
-          <p:nvPr>
-            <p:ph sz="half" idx="2"/>
-          </p:nvPr>
-        </p:nvSpPr>
-        <p:spPr>
-          <a:xfrm>
-            <a:off x="8719930" y="2266391"/>
-            <a:ext cx="3326295" cy="4168756"/>
-          </a:xfrm>
-        </p:spPr>
-        <p:txBody>
-          <a:bodyPr>
-            <a:normAutofit fontScale="70000" lnSpcReduction="20000"/>
-          </a:bodyPr>
-          <a:lstStyle/>
-          <a:p>
-            <a:r>
-              <a:rPr lang="en-US" dirty="0"/>
-              <a:t>The highest priced neighborhoods are </a:t>
-            </a:r>
-            <a:r>
-              <a:rPr lang="en-US" dirty="0" err="1"/>
-              <a:t>Interbay</a:t>
-            </a:r>
-            <a:r>
-              <a:rPr lang="en-US" dirty="0"/>
-              <a:t>, Downtown, and Queen Anne</a:t>
-            </a:r>
-          </a:p>
-          <a:p>
-            <a:endParaRPr lang="en-US" dirty="0"/>
-          </a:p>
-          <a:p>
-            <a:r>
-              <a:rPr lang="en-US" dirty="0"/>
-              <a:t>The highest-priced property types are Boats, Treehouses, and Bed &amp; Breakfast. </a:t>
-            </a:r>
-          </a:p>
-          <a:p>
-            <a:endParaRPr lang="en-US" dirty="0"/>
-          </a:p>
-          <a:p>
-            <a:r>
-              <a:rPr lang="en-US" dirty="0"/>
-              <a:t>Typical costs (per person) for houses, apartments, and condominiums are in 40 to 50$ range.</a:t>
-            </a:r>
-          </a:p>
-          <a:p>
-            <a:pPr marL="0" indent="0">
-              <a:buNone/>
-            </a:pPr>
-            <a:endParaRPr lang="en-US" dirty="0"/>
-          </a:p>
-        </p:txBody>
-      </p:sp>
-    </p:spTree>
-    <p:extLst>
-      <p:ext uri="{BB962C8B-B14F-4D97-AF65-F5344CB8AC3E}">
-        <p14:creationId xmlns:p14="http://schemas.microsoft.com/office/powerpoint/2010/main" val="3553335047"/>
-      </p:ext>
-    </p:extLst>
-  </p:cSld>
-  <p:clrMapOvr>
-    <a:masterClrMapping/>
-  </p:clrMapOvr>
-</p:sld>
-</file>
-
-<file path=ppt/slides/slide8.xml><?xml version="1.0" encoding="utf-8"?>
-<p:sld xmlns:a="http://schemas.openxmlformats.org/drawingml/2006/main" xmlns:r="http://schemas.openxmlformats.org/officeDocument/2006/relationships" xmlns:p="http://schemas.openxmlformats.org/presentationml/2006/main">
-  <p:cSld>
-    <p:spTree>
-      <p:nvGrpSpPr>
-        <p:cNvPr id="1" name=""/>
-        <p:cNvGrpSpPr/>
-        <p:nvPr/>
-      </p:nvGrpSpPr>
-      <p:grpSpPr>
-        <a:xfrm>
-          <a:off x="0" y="0"/>
-          <a:ext cx="0" cy="0"/>
-          <a:chOff x="0" y="0"/>
-          <a:chExt cx="0" cy="0"/>
-        </a:xfrm>
-      </p:grpSpPr>
-      <p:sp>
-        <p:nvSpPr>
           <p:cNvPr id="2" name="Title 1">
             <a:extLst>
               <a:ext uri="{FF2B5EF4-FFF2-40B4-BE49-F238E27FC236}">
@@ -5965,7 +5811,7 @@
 </p:sld>
 </file>
 
-<file path=ppt/slides/slide9.xml><?xml version="1.0" encoding="utf-8"?>
+<file path=ppt/slides/slide8.xml><?xml version="1.0" encoding="utf-8"?>
 <p:sld xmlns:a="http://schemas.openxmlformats.org/drawingml/2006/main" xmlns:r="http://schemas.openxmlformats.org/officeDocument/2006/relationships" xmlns:p="http://schemas.openxmlformats.org/presentationml/2006/main">
   <p:cSld>
     <p:spTree>
@@ -6159,6 +6005,148 @@
     <p:extLst>
       <p:ext uri="{BB962C8B-B14F-4D97-AF65-F5344CB8AC3E}">
         <p14:creationId xmlns:p14="http://schemas.microsoft.com/office/powerpoint/2010/main" val="398236197"/>
+      </p:ext>
+    </p:extLst>
+  </p:cSld>
+  <p:clrMapOvr>
+    <a:masterClrMapping/>
+  </p:clrMapOvr>
+</p:sld>
+</file>
+
+<file path=ppt/slides/slide9.xml><?xml version="1.0" encoding="utf-8"?>
+<p:sld xmlns:a="http://schemas.openxmlformats.org/drawingml/2006/main" xmlns:r="http://schemas.openxmlformats.org/officeDocument/2006/relationships" xmlns:p="http://schemas.openxmlformats.org/presentationml/2006/main">
+  <p:cSld>
+    <p:spTree>
+      <p:nvGrpSpPr>
+        <p:cNvPr id="1" name=""/>
+        <p:cNvGrpSpPr/>
+        <p:nvPr/>
+      </p:nvGrpSpPr>
+      <p:grpSpPr>
+        <a:xfrm>
+          <a:off x="0" y="0"/>
+          <a:ext cx="0" cy="0"/>
+          <a:chOff x="0" y="0"/>
+          <a:chExt cx="0" cy="0"/>
+        </a:xfrm>
+      </p:grpSpPr>
+      <p:sp>
+        <p:nvSpPr>
+          <p:cNvPr id="2" name="Title 1">
+            <a:extLst>
+              <a:ext uri="{FF2B5EF4-FFF2-40B4-BE49-F238E27FC236}">
+                <a16:creationId xmlns:a16="http://schemas.microsoft.com/office/drawing/2014/main" id="{55998238-E582-4A50-A58D-3EE341054F95}"/>
+              </a:ext>
+            </a:extLst>
+          </p:cNvPr>
+          <p:cNvSpPr>
+            <a:spLocks noGrp="1"/>
+          </p:cNvSpPr>
+          <p:nvPr>
+            <p:ph type="title"/>
+          </p:nvPr>
+        </p:nvSpPr>
+        <p:spPr/>
+        <p:txBody>
+          <a:bodyPr/>
+          <a:lstStyle/>
+          <a:p>
+            <a:r>
+              <a:rPr lang="en-US" dirty="0"/>
+              <a:t>PRICE and SIZE ARE IMPORTANT</a:t>
+            </a:r>
+          </a:p>
+        </p:txBody>
+      </p:sp>
+      <p:sp>
+        <p:nvSpPr>
+          <p:cNvPr id="4" name="Content Placeholder 3">
+            <a:extLst>
+              <a:ext uri="{FF2B5EF4-FFF2-40B4-BE49-F238E27FC236}">
+                <a16:creationId xmlns:a16="http://schemas.microsoft.com/office/drawing/2014/main" id="{5270B1CF-9DF3-4802-A864-538F08CFE5E7}"/>
+              </a:ext>
+            </a:extLst>
+          </p:cNvPr>
+          <p:cNvSpPr>
+            <a:spLocks noGrp="1"/>
+          </p:cNvSpPr>
+          <p:nvPr>
+            <p:ph sz="half" idx="2"/>
+          </p:nvPr>
+        </p:nvSpPr>
+        <p:spPr>
+          <a:xfrm>
+            <a:off x="1457740" y="5883965"/>
+            <a:ext cx="9623146" cy="844875"/>
+          </a:xfrm>
+        </p:spPr>
+        <p:txBody>
+          <a:bodyPr>
+            <a:normAutofit fontScale="70000" lnSpcReduction="20000"/>
+          </a:bodyPr>
+          <a:lstStyle/>
+          <a:p>
+            <a:r>
+              <a:rPr lang="en-US" dirty="0"/>
+              <a:t>Price per guest and the number of accommodated customers correlate very strongly with the revenue: the higher is the price per guest and the number of accommodated people, the higher is the revenue for the host</a:t>
+            </a:r>
+          </a:p>
+        </p:txBody>
+      </p:sp>
+      <p:pic>
+        <p:nvPicPr>
+          <p:cNvPr id="5122" name="Picture 2">
+            <a:extLst>
+              <a:ext uri="{FF2B5EF4-FFF2-40B4-BE49-F238E27FC236}">
+                <a16:creationId xmlns:a16="http://schemas.microsoft.com/office/drawing/2014/main" id="{23A64E6D-49E3-4E9E-B578-66D72DBDB69C}"/>
+              </a:ext>
+            </a:extLst>
+          </p:cNvPr>
+          <p:cNvPicPr>
+            <a:picLocks noGrp="1" noChangeAspect="1" noChangeArrowheads="1"/>
+          </p:cNvPicPr>
+          <p:nvPr>
+            <p:ph sz="half" idx="1"/>
+          </p:nvPr>
+        </p:nvPicPr>
+        <p:blipFill>
+          <a:blip r:embed="rId2">
+            <a:extLst>
+              <a:ext uri="{28A0092B-C50C-407E-A947-70E740481C1C}">
+                <a14:useLocalDpi xmlns:a14="http://schemas.microsoft.com/office/drawing/2010/main" val="0"/>
+              </a:ext>
+            </a:extLst>
+          </a:blip>
+          <a:srcRect/>
+          <a:stretch>
+            <a:fillRect/>
+          </a:stretch>
+        </p:blipFill>
+        <p:spPr bwMode="auto">
+          <a:xfrm>
+            <a:off x="1343894" y="2098149"/>
+            <a:ext cx="8125654" cy="3591142"/>
+          </a:xfrm>
+          <a:prstGeom prst="rect">
+            <a:avLst/>
+          </a:prstGeom>
+          <a:noFill/>
+          <a:extLst>
+            <a:ext uri="{909E8E84-426E-40DD-AFC4-6F175D3DCCD1}">
+              <a14:hiddenFill xmlns:a14="http://schemas.microsoft.com/office/drawing/2010/main">
+                <a:solidFill>
+                  <a:srgbClr val="FFFFFF"/>
+                </a:solidFill>
+              </a14:hiddenFill>
+            </a:ext>
+          </a:extLst>
+        </p:spPr>
+      </p:pic>
+    </p:spTree>
+    <p:extLst>
+      <p:ext uri="{BB962C8B-B14F-4D97-AF65-F5344CB8AC3E}">
+        <p14:creationId xmlns:p14="http://schemas.microsoft.com/office/powerpoint/2010/main" val="2779861495"/>
       </p:ext>
     </p:extLst>
   </p:cSld>

</xml_diff>